<commit_message>
Adding day 5 content and challenges and brief outline of day 6
</commit_message>
<xml_diff>
--- a/Slides/NodeJS.pptx
+++ b/Slides/NodeJS.pptx
@@ -7,9 +7,11 @@
   <p:sldIdLst>
     <p:sldId id="256" r:id="rId2"/>
     <p:sldId id="257" r:id="rId3"/>
-    <p:sldId id="258" r:id="rId4"/>
-    <p:sldId id="259" r:id="rId5"/>
-    <p:sldId id="262" r:id="rId6"/>
+    <p:sldId id="263" r:id="rId4"/>
+    <p:sldId id="258" r:id="rId5"/>
+    <p:sldId id="264" r:id="rId6"/>
+    <p:sldId id="259" r:id="rId7"/>
+    <p:sldId id="262" r:id="rId8"/>
   </p:sldIdLst>
   <p:sldSz cx="12192000" cy="6858000"/>
   <p:notesSz cx="6858000" cy="9144000"/>
@@ -110,7 +112,18 @@
   </p:defaultTextStyle>
   <p:extLst>
     <p:ext uri="{EFAFB233-063F-42B5-8137-9DF3F51BA10A}">
-      <p15:sldGuideLst xmlns:p15="http://schemas.microsoft.com/office/powerpoint/2012/main" xmlns=""/>
+      <p15:sldGuideLst xmlns:p15="http://schemas.microsoft.com/office/powerpoint/2012/main">
+        <p15:guide id="1" orient="horz" pos="2160">
+          <p15:clr>
+            <a:srgbClr val="A4A3A4"/>
+          </p15:clr>
+        </p15:guide>
+        <p15:guide id="2" pos="3840">
+          <p15:clr>
+            <a:srgbClr val="A4A3A4"/>
+          </p15:clr>
+        </p15:guide>
+      </p15:sldGuideLst>
     </p:ext>
   </p:extLst>
 </p:presentation>
@@ -3909,7 +3922,7 @@
         <p:spPr/>
         <p:txBody>
           <a:bodyPr>
-            <a:normAutofit/>
+            <a:noAutofit/>
           </a:bodyPr>
           <a:lstStyle/>
           <a:p>
@@ -3918,16 +3931,8 @@
               <a:buChar char="§"/>
             </a:pPr>
             <a:r>
-              <a:rPr lang="en-US" sz="2400" dirty="0" smtClean="0"/>
-              <a:t> node.js is a </a:t>
-            </a:r>
-            <a:r>
-              <a:rPr lang="en-US" sz="2400" dirty="0" smtClean="0"/>
-              <a:t>runtime </a:t>
-            </a:r>
-            <a:r>
-              <a:rPr lang="en-US" sz="2400" dirty="0" smtClean="0"/>
-              <a:t>for running JavaScript </a:t>
+              <a:rPr lang="en-US" sz="3600" dirty="0" smtClean="0"/>
+              <a:t> node.js is a runtime for running JavaScript </a:t>
             </a:r>
           </a:p>
           <a:p>
@@ -3936,69 +3941,39 @@
               <a:buChar char="§"/>
             </a:pPr>
             <a:r>
-              <a:rPr lang="en-US" sz="2400" dirty="0"/>
-              <a:t>B</a:t>
-            </a:r>
-            <a:r>
-              <a:rPr lang="en-US" sz="2400" dirty="0" smtClean="0"/>
-              <a:t>ased on Google’s V8 engine</a:t>
-            </a:r>
+              <a:rPr lang="en-US" sz="3600" smtClean="0"/>
+              <a:t> Based </a:t>
+            </a:r>
+            <a:r>
+              <a:rPr lang="en-US" sz="3600" dirty="0" smtClean="0"/>
+              <a:t>on Google’s V8 </a:t>
+            </a:r>
+            <a:r>
+              <a:rPr lang="en-US" sz="3600" dirty="0" smtClean="0"/>
+              <a:t>engine</a:t>
+            </a:r>
+          </a:p>
+          <a:p>
+            <a:pPr lvl="1">
+              <a:buFont typeface="Wingdings" panose="05000000000000000000" pitchFamily="2" charset="2"/>
+              <a:buChar char="§"/>
+            </a:pPr>
+            <a:endParaRPr lang="en-US" sz="3600" dirty="0"/>
           </a:p>
           <a:p>
             <a:pPr>
               <a:buFont typeface="Wingdings" panose="05000000000000000000" pitchFamily="2" charset="2"/>
               <a:buChar char="§"/>
             </a:pPr>
-            <a:endParaRPr lang="en-US" sz="2400" dirty="0"/>
-          </a:p>
-          <a:p>
-            <a:pPr>
-              <a:buFont typeface="Wingdings" panose="05000000000000000000" pitchFamily="2" charset="2"/>
-              <a:buChar char="§"/>
-            </a:pPr>
-            <a:r>
-              <a:rPr lang="en-US" sz="2400" dirty="0"/>
+            <a:r>
+              <a:rPr lang="en-US" sz="3600" dirty="0"/>
               <a:t> node is based on packages – collections of code that can be </a:t>
             </a:r>
             <a:r>
-              <a:rPr lang="en-US" sz="2400" dirty="0" smtClean="0"/>
+              <a:rPr lang="en-US" sz="3600" dirty="0" smtClean="0"/>
               <a:t>reused</a:t>
             </a:r>
-          </a:p>
-          <a:p>
-            <a:pPr>
-              <a:buFont typeface="Wingdings" panose="05000000000000000000" pitchFamily="2" charset="2"/>
-              <a:buChar char="§"/>
-            </a:pPr>
-            <a:endParaRPr lang="en-US" sz="2400" dirty="0"/>
-          </a:p>
-          <a:p>
-            <a:pPr>
-              <a:buFont typeface="Wingdings" panose="05000000000000000000" pitchFamily="2" charset="2"/>
-              <a:buChar char="§"/>
-            </a:pPr>
-            <a:r>
-              <a:rPr lang="en-US" sz="2400" dirty="0" smtClean="0"/>
-              <a:t> </a:t>
-            </a:r>
-            <a:r>
-              <a:rPr lang="en-US" sz="2400" dirty="0" err="1" smtClean="0"/>
-              <a:t>npm</a:t>
-            </a:r>
-            <a:r>
-              <a:rPr lang="en-US" sz="2400" dirty="0" smtClean="0"/>
-              <a:t> </a:t>
-            </a:r>
-            <a:r>
-              <a:rPr lang="en-US" sz="2400" dirty="0"/>
-              <a:t>is the node package manager – a system for declaring what packages your code needs and publishing your own packages that other people can use</a:t>
-            </a:r>
-          </a:p>
-          <a:p>
-            <a:pPr marL="0" indent="0">
-              <a:buNone/>
-            </a:pPr>
-            <a:endParaRPr lang="en-US" sz="2400" dirty="0" smtClean="0"/>
+            <a:endParaRPr lang="en-US" sz="3600" dirty="0"/>
           </a:p>
         </p:txBody>
       </p:sp>
@@ -4056,7 +4031,15 @@
           <a:p>
             <a:r>
               <a:rPr lang="en-US" dirty="0" smtClean="0"/>
-              <a:t>Why use node.js?</a:t>
+              <a:t>What is </a:t>
+            </a:r>
+            <a:r>
+              <a:rPr lang="en-US" dirty="0" err="1" smtClean="0"/>
+              <a:t>npm</a:t>
+            </a:r>
+            <a:r>
+              <a:rPr lang="en-US" dirty="0" smtClean="0"/>
+              <a:t>?</a:t>
             </a:r>
             <a:endParaRPr lang="en-US" dirty="0"/>
           </a:p>
@@ -4084,8 +4067,24 @@
               <a:buChar char="§"/>
             </a:pPr>
             <a:r>
-              <a:rPr lang="en-US" sz="2400" dirty="0" smtClean="0"/>
-              <a:t> You can write your entire client-server application in JavaScript instead of having to use multiple languages</a:t>
+              <a:rPr lang="en-US" sz="3600" dirty="0" smtClean="0"/>
+              <a:t> </a:t>
+            </a:r>
+            <a:r>
+              <a:rPr lang="en-US" sz="3600" dirty="0" err="1" smtClean="0"/>
+              <a:t>npm</a:t>
+            </a:r>
+            <a:r>
+              <a:rPr lang="en-US" sz="3600" dirty="0" smtClean="0"/>
+              <a:t> </a:t>
+            </a:r>
+            <a:r>
+              <a:rPr lang="en-US" sz="3600" dirty="0"/>
+              <a:t>is the node package </a:t>
+            </a:r>
+            <a:r>
+              <a:rPr lang="en-US" sz="3600" dirty="0" smtClean="0"/>
+              <a:t>manager </a:t>
             </a:r>
           </a:p>
           <a:p>
@@ -4093,7 +4092,7 @@
               <a:buFont typeface="Wingdings" panose="05000000000000000000" pitchFamily="2" charset="2"/>
               <a:buChar char="§"/>
             </a:pPr>
-            <a:endParaRPr lang="en-US" sz="2400" dirty="0"/>
+            <a:endParaRPr lang="en-US" sz="3600" dirty="0"/>
           </a:p>
           <a:p>
             <a:pPr>
@@ -4101,8 +4100,159 @@
               <a:buChar char="§"/>
             </a:pPr>
             <a:r>
-              <a:rPr lang="en-US" sz="2400" dirty="0" smtClean="0"/>
-              <a:t> node scales extremely well for I/O based applications </a:t>
+              <a:rPr lang="en-US" sz="3600" dirty="0" smtClean="0"/>
+              <a:t> Declare </a:t>
+            </a:r>
+            <a:r>
+              <a:rPr lang="en-US" sz="3600" dirty="0"/>
+              <a:t>what packages your code </a:t>
+            </a:r>
+            <a:r>
+              <a:rPr lang="en-US" sz="3600" dirty="0" smtClean="0"/>
+              <a:t>needs</a:t>
+            </a:r>
+          </a:p>
+          <a:p>
+            <a:pPr>
+              <a:buFont typeface="Wingdings" panose="05000000000000000000" pitchFamily="2" charset="2"/>
+              <a:buChar char="§"/>
+            </a:pPr>
+            <a:endParaRPr lang="en-US" sz="3600" dirty="0"/>
+          </a:p>
+          <a:p>
+            <a:pPr>
+              <a:buFont typeface="Wingdings" panose="05000000000000000000" pitchFamily="2" charset="2"/>
+              <a:buChar char="§"/>
+            </a:pPr>
+            <a:r>
+              <a:rPr lang="en-US" sz="3600" dirty="0" smtClean="0"/>
+              <a:t> Publish your </a:t>
+            </a:r>
+            <a:r>
+              <a:rPr lang="en-US" sz="3600" dirty="0"/>
+              <a:t>own packages that other people can use</a:t>
+            </a:r>
+          </a:p>
+          <a:p>
+            <a:pPr>
+              <a:buFont typeface="Wingdings" panose="05000000000000000000" pitchFamily="2" charset="2"/>
+              <a:buChar char="§"/>
+            </a:pPr>
+            <a:endParaRPr lang="en-US" sz="3600" dirty="0"/>
+          </a:p>
+        </p:txBody>
+      </p:sp>
+    </p:spTree>
+    <p:extLst>
+      <p:ext uri="{BB962C8B-B14F-4D97-AF65-F5344CB8AC3E}">
+        <p14:creationId xmlns:p14="http://schemas.microsoft.com/office/powerpoint/2010/main" val="3389595570"/>
+      </p:ext>
+    </p:extLst>
+  </p:cSld>
+  <p:clrMapOvr>
+    <a:masterClrMapping/>
+  </p:clrMapOvr>
+</p:sld>
+</file>
+
+<file path=ppt/slides/slide4.xml><?xml version="1.0" encoding="utf-8"?>
+<p:sld xmlns:a="http://schemas.openxmlformats.org/drawingml/2006/main" xmlns:r="http://schemas.openxmlformats.org/officeDocument/2006/relationships" xmlns:p="http://schemas.openxmlformats.org/presentationml/2006/main">
+  <p:cSld>
+    <p:spTree>
+      <p:nvGrpSpPr>
+        <p:cNvPr id="1" name=""/>
+        <p:cNvGrpSpPr/>
+        <p:nvPr/>
+      </p:nvGrpSpPr>
+      <p:grpSpPr>
+        <a:xfrm>
+          <a:off x="0" y="0"/>
+          <a:ext cx="0" cy="0"/>
+          <a:chOff x="0" y="0"/>
+          <a:chExt cx="0" cy="0"/>
+        </a:xfrm>
+      </p:grpSpPr>
+      <p:sp>
+        <p:nvSpPr>
+          <p:cNvPr id="2" name="Title 1"/>
+          <p:cNvSpPr>
+            <a:spLocks noGrp="1"/>
+          </p:cNvSpPr>
+          <p:nvPr>
+            <p:ph type="title"/>
+          </p:nvPr>
+        </p:nvSpPr>
+        <p:spPr>
+          <a:xfrm>
+            <a:off x="1097280" y="862885"/>
+            <a:ext cx="10058400" cy="874475"/>
+          </a:xfrm>
+        </p:spPr>
+        <p:txBody>
+          <a:bodyPr/>
+          <a:lstStyle/>
+          <a:p>
+            <a:r>
+              <a:rPr lang="en-US" dirty="0" smtClean="0"/>
+              <a:t>Why use node.js?</a:t>
+            </a:r>
+            <a:endParaRPr lang="en-US" dirty="0"/>
+          </a:p>
+        </p:txBody>
+      </p:sp>
+      <p:sp>
+        <p:nvSpPr>
+          <p:cNvPr id="3" name="Content Placeholder 2"/>
+          <p:cNvSpPr>
+            <a:spLocks noGrp="1"/>
+          </p:cNvSpPr>
+          <p:nvPr>
+            <p:ph idx="1"/>
+          </p:nvPr>
+        </p:nvSpPr>
+        <p:spPr/>
+        <p:txBody>
+          <a:bodyPr>
+            <a:noAutofit/>
+          </a:bodyPr>
+          <a:lstStyle/>
+          <a:p>
+            <a:pPr>
+              <a:buFont typeface="Wingdings" panose="05000000000000000000" pitchFamily="2" charset="2"/>
+              <a:buChar char="§"/>
+            </a:pPr>
+            <a:r>
+              <a:rPr lang="en-US" sz="3600" dirty="0" smtClean="0"/>
+              <a:t> You can write your entire client-server application in JavaScript instead of having to use multiple </a:t>
+            </a:r>
+            <a:r>
+              <a:rPr lang="en-US" sz="3600" dirty="0" smtClean="0"/>
+              <a:t>languages</a:t>
+            </a:r>
+            <a:endParaRPr lang="en-US" sz="3600" dirty="0"/>
+          </a:p>
+          <a:p>
+            <a:pPr marL="0" indent="0">
+              <a:buNone/>
+            </a:pPr>
+            <a:endParaRPr lang="en-US" sz="3600" dirty="0" smtClean="0"/>
+          </a:p>
+          <a:p>
+            <a:pPr>
+              <a:buFont typeface="Wingdings" panose="05000000000000000000" pitchFamily="2" charset="2"/>
+              <a:buChar char="§"/>
+            </a:pPr>
+            <a:r>
+              <a:rPr lang="en-US" sz="3600" dirty="0"/>
+              <a:t> </a:t>
+            </a:r>
+            <a:r>
+              <a:rPr lang="en-US" sz="3600" dirty="0" smtClean="0"/>
+              <a:t>node </a:t>
+            </a:r>
+            <a:r>
+              <a:rPr lang="en-US" sz="3600" dirty="0" smtClean="0"/>
+              <a:t>scales extremely well for I/O based applications </a:t>
             </a:r>
           </a:p>
           <a:p>
@@ -4111,37 +4261,18 @@
               <a:buChar char="§"/>
             </a:pPr>
             <a:r>
-              <a:rPr lang="en-US" sz="2400" dirty="0" smtClean="0"/>
-              <a:t>Event driven, asynchronous I/O</a:t>
-            </a:r>
-          </a:p>
-          <a:p>
-            <a:pPr lvl="1">
-              <a:buFont typeface="Wingdings" panose="05000000000000000000" pitchFamily="2" charset="2"/>
-              <a:buChar char="§"/>
-            </a:pPr>
-            <a:endParaRPr lang="en-US" sz="2400" dirty="0"/>
-          </a:p>
-          <a:p>
-            <a:pPr>
-              <a:buFont typeface="Wingdings" panose="05000000000000000000" pitchFamily="2" charset="2"/>
-              <a:buChar char="§"/>
-            </a:pPr>
-            <a:r>
-              <a:rPr lang="en-US" sz="2400" dirty="0" smtClean="0"/>
-              <a:t> Just like every technology, there are also cases where node is a bad idea</a:t>
-            </a:r>
-          </a:p>
-          <a:p>
-            <a:pPr lvl="1">
-              <a:buFont typeface="Wingdings" panose="05000000000000000000" pitchFamily="2" charset="2"/>
-              <a:buChar char="§"/>
-            </a:pPr>
-            <a:r>
-              <a:rPr lang="en-US" sz="2400" dirty="0" smtClean="0"/>
-              <a:t>CPU intensive programs, because it’s single threaded</a:t>
-            </a:r>
-            <a:endParaRPr lang="en-US" sz="2400" dirty="0"/>
+              <a:rPr lang="en-US" sz="3600" dirty="0" smtClean="0"/>
+              <a:t> Event </a:t>
+            </a:r>
+            <a:r>
+              <a:rPr lang="en-US" sz="3600" dirty="0" smtClean="0"/>
+              <a:t>driven, asynchronous </a:t>
+            </a:r>
+            <a:r>
+              <a:rPr lang="en-US" sz="3600" dirty="0" smtClean="0"/>
+              <a:t>I/O</a:t>
+            </a:r>
+            <a:endParaRPr lang="en-US" sz="3600" dirty="0"/>
           </a:p>
         </p:txBody>
       </p:sp>
@@ -4165,7 +4296,111 @@
 </p:sld>
 </file>
 
-<file path=ppt/slides/slide4.xml><?xml version="1.0" encoding="utf-8"?>
+<file path=ppt/slides/slide5.xml><?xml version="1.0" encoding="utf-8"?>
+<p:sld xmlns:a="http://schemas.openxmlformats.org/drawingml/2006/main" xmlns:r="http://schemas.openxmlformats.org/officeDocument/2006/relationships" xmlns:p="http://schemas.openxmlformats.org/presentationml/2006/main">
+  <p:cSld>
+    <p:spTree>
+      <p:nvGrpSpPr>
+        <p:cNvPr id="1" name=""/>
+        <p:cNvGrpSpPr/>
+        <p:nvPr/>
+      </p:nvGrpSpPr>
+      <p:grpSpPr>
+        <a:xfrm>
+          <a:off x="0" y="0"/>
+          <a:ext cx="0" cy="0"/>
+          <a:chOff x="0" y="0"/>
+          <a:chExt cx="0" cy="0"/>
+        </a:xfrm>
+      </p:grpSpPr>
+      <p:sp>
+        <p:nvSpPr>
+          <p:cNvPr id="2" name="Title 1"/>
+          <p:cNvSpPr>
+            <a:spLocks noGrp="1"/>
+          </p:cNvSpPr>
+          <p:nvPr>
+            <p:ph type="title"/>
+          </p:nvPr>
+        </p:nvSpPr>
+        <p:spPr/>
+        <p:txBody>
+          <a:bodyPr/>
+          <a:lstStyle/>
+          <a:p>
+            <a:r>
+              <a:rPr lang="en-US" dirty="0" smtClean="0"/>
+              <a:t>But...</a:t>
+            </a:r>
+            <a:endParaRPr lang="en-US" dirty="0"/>
+          </a:p>
+        </p:txBody>
+      </p:sp>
+      <p:sp>
+        <p:nvSpPr>
+          <p:cNvPr id="3" name="Content Placeholder 2"/>
+          <p:cNvSpPr>
+            <a:spLocks noGrp="1"/>
+          </p:cNvSpPr>
+          <p:nvPr>
+            <p:ph idx="1"/>
+          </p:nvPr>
+        </p:nvSpPr>
+        <p:spPr/>
+        <p:txBody>
+          <a:bodyPr/>
+          <a:lstStyle/>
+          <a:p>
+            <a:pPr>
+              <a:buFont typeface="Wingdings" panose="05000000000000000000" pitchFamily="2" charset="2"/>
+              <a:buChar char="§"/>
+            </a:pPr>
+            <a:r>
+              <a:rPr lang="en-US" sz="3600" dirty="0" smtClean="0"/>
+              <a:t> Just </a:t>
+            </a:r>
+            <a:r>
+              <a:rPr lang="en-US" sz="3600" dirty="0"/>
+              <a:t>like every technology, there are also cases where node is a bad idea</a:t>
+            </a:r>
+          </a:p>
+          <a:p>
+            <a:pPr lvl="1">
+              <a:buFont typeface="Wingdings" panose="05000000000000000000" pitchFamily="2" charset="2"/>
+              <a:buChar char="§"/>
+            </a:pPr>
+            <a:r>
+              <a:rPr lang="en-US" sz="3600" dirty="0" smtClean="0"/>
+              <a:t> CPU </a:t>
+            </a:r>
+            <a:r>
+              <a:rPr lang="en-US" sz="3600" dirty="0"/>
+              <a:t>intensive programs, because it’s single threaded</a:t>
+            </a:r>
+          </a:p>
+          <a:p>
+            <a:pPr>
+              <a:buFont typeface="Wingdings" panose="05000000000000000000" pitchFamily="2" charset="2"/>
+              <a:buChar char="§"/>
+            </a:pPr>
+            <a:endParaRPr lang="en-US" dirty="0"/>
+          </a:p>
+        </p:txBody>
+      </p:sp>
+    </p:spTree>
+    <p:extLst>
+      <p:ext uri="{BB962C8B-B14F-4D97-AF65-F5344CB8AC3E}">
+        <p14:creationId xmlns:p14="http://schemas.microsoft.com/office/powerpoint/2010/main" val="859654390"/>
+      </p:ext>
+    </p:extLst>
+  </p:cSld>
+  <p:clrMapOvr>
+    <a:masterClrMapping/>
+  </p:clrMapOvr>
+</p:sld>
+</file>
+
+<file path=ppt/slides/slide6.xml><?xml version="1.0" encoding="utf-8"?>
 <p:sld xmlns:a="http://schemas.openxmlformats.org/drawingml/2006/main" xmlns:r="http://schemas.openxmlformats.org/officeDocument/2006/relationships" xmlns:p="http://schemas.openxmlformats.org/presentationml/2006/main">
   <p:cSld>
     <p:spTree>
@@ -4225,7 +4460,7 @@
 </p:sld>
 </file>
 
-<file path=ppt/slides/slide5.xml><?xml version="1.0" encoding="utf-8"?>
+<file path=ppt/slides/slide7.xml><?xml version="1.0" encoding="utf-8"?>
 <p:sld xmlns:a="http://schemas.openxmlformats.org/drawingml/2006/main" xmlns:r="http://schemas.openxmlformats.org/officeDocument/2006/relationships" xmlns:p="http://schemas.openxmlformats.org/presentationml/2006/main">
   <p:cSld>
     <p:spTree>
@@ -4562,7 +4797,7 @@
   <a:extraClrSchemeLst/>
   <a:extLst>
     <a:ext uri="{05A4C25C-085E-4340-85A3-A5531E510DB2}">
-      <thm15:themeFamily xmlns:thm15="http://schemas.microsoft.com/office/thememl/2012/main" xmlns="" name="Retrospect" id="{5F128B03-DCCA-4EEB-AB3B-CF2899314A46}" vid="{3F1AAB62-24C6-49D2-8E01-B56FAC9A3DCD}"/>
+      <thm15:themeFamily xmlns:thm15="http://schemas.microsoft.com/office/thememl/2012/main" name="Retrospect" id="{5F128B03-DCCA-4EEB-AB3B-CF2899314A46}" vid="{3F1AAB62-24C6-49D2-8E01-B56FAC9A3DCD}"/>
     </a:ext>
   </a:extLst>
 </a:theme>

</xml_diff>